<commit_message>
Added bias vs variance to the presentation.
</commit_message>
<xml_diff>
--- a/source/math_linreg2/00_MAPS/presentation.pptx
+++ b/source/math_linreg2/00_MAPS/presentation.pptx
@@ -14,6 +14,9 @@
     <p:sldId id="261" r:id="rId9"/>
     <p:sldId id="262" r:id="rId10"/>
     <p:sldId id="263" r:id="rId11"/>
+    <p:sldId id="264" r:id="rId12"/>
+    <p:sldId id="265" r:id="rId13"/>
+    <p:sldId id="266" r:id="rId14"/>
   </p:sldIdLst>
   <p:sldSz cx="12192000" cy="6858000"/>
   <p:notesSz cx="7559675" cy="10691812"/>
@@ -2993,13 +2996,7 @@
               <a:rPr b="0" lang="en-US" sz="4400" spc="-1" strike="noStrike">
                 <a:latin typeface="Arial"/>
               </a:rPr>
-              <a:t>Click to edit the </a:t>
-            </a:r>
-            <a:r>
-              <a:rPr b="0" lang="en-US" sz="4400" spc="-1" strike="noStrike">
-                <a:latin typeface="Arial"/>
-              </a:rPr>
-              <a:t>title text format</a:t>
+              <a:t>Click to edit the title text format</a:t>
             </a:r>
             <a:endParaRPr b="0" lang="en-US" sz="4400" spc="-1" strike="noStrike">
               <a:latin typeface="Arial"/>
@@ -3232,7 +3229,7 @@
         <p:spPr>
           <a:xfrm>
             <a:off x="1523880" y="181440"/>
-            <a:ext cx="9142560" cy="1191960"/>
+            <a:ext cx="9141840" cy="1191240"/>
           </a:xfrm>
           <a:prstGeom prst="rect">
             <a:avLst/>
@@ -3283,7 +3280,7 @@
         </p:nvGraphicFramePr>
         <p:xfrm>
           <a:off x="1759680" y="1770120"/>
-          <a:ext cx="8127360" cy="1110960"/>
+          <a:ext cx="8127360" cy="1110240"/>
         </p:xfrm>
         <a:graphic>
           <a:graphicData uri="http://schemas.openxmlformats.org/drawingml/2006/table">
@@ -3471,7 +3468,7 @@
                   </a:tcPr>
                 </a:tc>
               </a:tr>
-              <a:tr h="369360">
+              <a:tr h="368640">
                 <a:tc>
                   <a:txBody>
                     <a:bodyPr/>
@@ -3584,7 +3581,7 @@
         <p:spPr>
           <a:xfrm>
             <a:off x="1290600" y="3864960"/>
-            <a:ext cx="9609480" cy="912240"/>
+            <a:ext cx="9608760" cy="911520"/>
           </a:xfrm>
           <a:prstGeom prst="rect">
             <a:avLst/>
@@ -3683,6 +3680,485 @@
           <p:childTnLst>
             <p:seq>
               <p:cTn id="2" dur="indefinite" nodeType="mainSeq"/>
+              <p:prevCondLst>
+                <p:cond delay="0" evt="onPrev">
+                  <p:tgtEl>
+                    <p:sldTgt/>
+                  </p:tgtEl>
+                </p:cond>
+              </p:prevCondLst>
+              <p:nextCondLst>
+                <p:cond delay="0" evt="onNext">
+                  <p:tgtEl>
+                    <p:sldTgt/>
+                  </p:tgtEl>
+                </p:cond>
+              </p:nextCondLst>
+            </p:seq>
+          </p:childTnLst>
+        </p:cTn>
+      </p:par>
+    </p:tnLst>
+  </p:timing>
+</p:sld>
+</file>
+
+<file path=ppt/slides/slide10.xml><?xml version="1.0" encoding="utf-8"?>
+<p:sld xmlns:a="http://schemas.openxmlformats.org/drawingml/2006/main" xmlns:p="http://schemas.openxmlformats.org/presentationml/2006/main" xmlns:r="http://schemas.openxmlformats.org/officeDocument/2006/relationships" xmlns:p14="http://schemas.microsoft.com/office/powerpoint/2010/main" xmlns:p15="http://schemas.microsoft.com/office/powerpoint/2012/main" xmlns:mc="http://schemas.openxmlformats.org/markup-compatibility/2006">
+  <p:cSld>
+    <p:spTree>
+      <p:nvGrpSpPr>
+        <p:cNvPr id="1" name=""/>
+        <p:cNvGrpSpPr/>
+        <p:nvPr/>
+      </p:nvGrpSpPr>
+      <p:grpSpPr>
+        <a:xfrm>
+          <a:off x="0" y="0"/>
+          <a:ext cx="0" cy="0"/>
+          <a:chOff x="0" y="0"/>
+          <a:chExt cx="0" cy="0"/>
+        </a:xfrm>
+      </p:grpSpPr>
+      <p:sp>
+        <p:nvSpPr>
+          <p:cNvPr id="95" name="CustomShape 1"/>
+          <p:cNvSpPr/>
+          <p:nvPr/>
+        </p:nvSpPr>
+        <p:spPr>
+          <a:xfrm>
+            <a:off x="838080" y="365040"/>
+            <a:ext cx="10513440" cy="1323360"/>
+          </a:xfrm>
+          <a:prstGeom prst="rect">
+            <a:avLst/>
+          </a:prstGeom>
+          <a:noFill/>
+          <a:ln>
+            <a:noFill/>
+          </a:ln>
+        </p:spPr>
+        <p:style>
+          <a:lnRef idx="0"/>
+          <a:fillRef idx="0"/>
+          <a:effectRef idx="0"/>
+          <a:fontRef idx="minor"/>
+        </p:style>
+        <p:txBody>
+          <a:bodyPr lIns="0" rIns="0" tIns="0" bIns="0" anchor="ctr"/>
+          <a:p>
+            <a:pPr>
+              <a:lnSpc>
+                <a:spcPct val="100000"/>
+              </a:lnSpc>
+            </a:pPr>
+            <a:r>
+              <a:rPr b="0" lang="en-US" sz="2600" spc="-1" strike="noStrike">
+                <a:solidFill>
+                  <a:srgbClr val="000000"/>
+                </a:solidFill>
+                <a:latin typeface="Calibri"/>
+                <a:ea typeface="DejaVu Sans"/>
+              </a:rPr>
+              <a:t>Bias</a:t>
+            </a:r>
+            <a:endParaRPr b="0" lang="en-US" sz="2600" spc="-1" strike="noStrike">
+              <a:latin typeface="Arial"/>
+            </a:endParaRPr>
+          </a:p>
+          <a:p>
+            <a:pPr>
+              <a:lnSpc>
+                <a:spcPct val="100000"/>
+              </a:lnSpc>
+            </a:pPr>
+            <a:endParaRPr b="0" lang="en-US" sz="2600" spc="-1" strike="noStrike">
+              <a:latin typeface="Arial"/>
+            </a:endParaRPr>
+          </a:p>
+        </p:txBody>
+      </p:sp>
+      <p:sp>
+        <p:nvSpPr>
+          <p:cNvPr id="96" name="CustomShape 2"/>
+          <p:cNvSpPr/>
+          <p:nvPr/>
+        </p:nvSpPr>
+        <p:spPr>
+          <a:xfrm>
+            <a:off x="1188720" y="2011680"/>
+            <a:ext cx="9416520" cy="1624320"/>
+          </a:xfrm>
+          <a:prstGeom prst="rect">
+            <a:avLst/>
+          </a:prstGeom>
+          <a:noFill/>
+          <a:ln>
+            <a:noFill/>
+          </a:ln>
+        </p:spPr>
+        <p:style>
+          <a:lnRef idx="0"/>
+          <a:fillRef idx="0"/>
+          <a:effectRef idx="0"/>
+          <a:fontRef idx="minor"/>
+        </p:style>
+      </p:sp>
+      <p:sp>
+        <p:nvSpPr>
+          <p:cNvPr id="97" name="CustomShape 3"/>
+          <p:cNvSpPr/>
+          <p:nvPr/>
+        </p:nvSpPr>
+        <p:spPr>
+          <a:xfrm>
+            <a:off x="1188720" y="2183040"/>
+            <a:ext cx="9416520" cy="1624320"/>
+          </a:xfrm>
+          <a:prstGeom prst="rect">
+            <a:avLst/>
+          </a:prstGeom>
+          <a:noFill/>
+          <a:ln>
+            <a:noFill/>
+          </a:ln>
+        </p:spPr>
+        <p:style>
+          <a:lnRef idx="0"/>
+          <a:fillRef idx="0"/>
+          <a:effectRef idx="0"/>
+          <a:fontRef idx="minor"/>
+        </p:style>
+        <p:txBody>
+          <a:bodyPr lIns="90000" rIns="90000" tIns="45000" bIns="45000"/>
+          <a:p>
+            <a:pPr>
+              <a:lnSpc>
+                <a:spcPct val="100000"/>
+              </a:lnSpc>
+            </a:pPr>
+            <a:r>
+              <a:rPr b="0" lang="en-US" sz="1800" spc="-1" strike="noStrike">
+                <a:solidFill>
+                  <a:srgbClr val="0563c1"/>
+                </a:solidFill>
+                <a:latin typeface="Arial"/>
+                <a:ea typeface="DejaVu Sans"/>
+              </a:rPr>
+              <a:t>Bias to generalized error, ktory bedzie nawet gdy bedziemy mieli nieskonczenie wiele sampli. Wynika on np. Ze zbyt malej liczby parametrow (w regresji liniowej np.)</a:t>
+            </a:r>
+            <a:endParaRPr b="0" lang="en-US" sz="1800" spc="-1" strike="noStrike">
+              <a:latin typeface="Arial"/>
+            </a:endParaRPr>
+          </a:p>
+          <a:p>
+            <a:pPr>
+              <a:lnSpc>
+                <a:spcPct val="100000"/>
+              </a:lnSpc>
+            </a:pPr>
+            <a:endParaRPr b="0" lang="en-US" sz="1800" spc="-1" strike="noStrike">
+              <a:latin typeface="Arial"/>
+            </a:endParaRPr>
+          </a:p>
+          <a:p>
+            <a:pPr>
+              <a:lnSpc>
+                <a:spcPct val="100000"/>
+              </a:lnSpc>
+            </a:pPr>
+            <a:r>
+              <a:rPr b="0" lang="en-US" sz="1800" spc="-1" strike="noStrike">
+                <a:solidFill>
+                  <a:srgbClr val="0563c1"/>
+                </a:solidFill>
+                <a:latin typeface="Arial"/>
+                <a:ea typeface="DejaVu Sans"/>
+              </a:rPr>
+              <a:t>Jest to DOKŁADNIE lewy skladnik rownania z nastepnego slajdu/</a:t>
+            </a:r>
+            <a:endParaRPr b="0" lang="en-US" sz="1800" spc="-1" strike="noStrike">
+              <a:latin typeface="Arial"/>
+            </a:endParaRPr>
+          </a:p>
+        </p:txBody>
+      </p:sp>
+    </p:spTree>
+  </p:cSld>
+  <p:timing>
+    <p:tnLst>
+      <p:par>
+        <p:cTn id="19" dur="indefinite" restart="never" nodeType="tmRoot">
+          <p:childTnLst>
+            <p:seq>
+              <p:cTn id="20" dur="indefinite" nodeType="mainSeq"/>
+              <p:prevCondLst>
+                <p:cond delay="0" evt="onPrev">
+                  <p:tgtEl>
+                    <p:sldTgt/>
+                  </p:tgtEl>
+                </p:cond>
+              </p:prevCondLst>
+              <p:nextCondLst>
+                <p:cond delay="0" evt="onNext">
+                  <p:tgtEl>
+                    <p:sldTgt/>
+                  </p:tgtEl>
+                </p:cond>
+              </p:nextCondLst>
+            </p:seq>
+          </p:childTnLst>
+        </p:cTn>
+      </p:par>
+    </p:tnLst>
+  </p:timing>
+</p:sld>
+</file>
+
+<file path=ppt/slides/slide11.xml><?xml version="1.0" encoding="utf-8"?>
+<p:sld xmlns:a="http://schemas.openxmlformats.org/drawingml/2006/main" xmlns:p="http://schemas.openxmlformats.org/presentationml/2006/main" xmlns:r="http://schemas.openxmlformats.org/officeDocument/2006/relationships" xmlns:p14="http://schemas.microsoft.com/office/powerpoint/2010/main" xmlns:p15="http://schemas.microsoft.com/office/powerpoint/2012/main" xmlns:mc="http://schemas.openxmlformats.org/markup-compatibility/2006">
+  <p:cSld>
+    <p:spTree>
+      <p:nvGrpSpPr>
+        <p:cNvPr id="1" name=""/>
+        <p:cNvGrpSpPr/>
+        <p:nvPr/>
+      </p:nvGrpSpPr>
+      <p:grpSpPr>
+        <a:xfrm>
+          <a:off x="0" y="0"/>
+          <a:ext cx="0" cy="0"/>
+          <a:chOff x="0" y="0"/>
+          <a:chExt cx="0" cy="0"/>
+        </a:xfrm>
+      </p:grpSpPr>
+      <p:sp>
+        <p:nvSpPr>
+          <p:cNvPr id="98" name="CustomShape 1"/>
+          <p:cNvSpPr/>
+          <p:nvPr/>
+        </p:nvSpPr>
+        <p:spPr>
+          <a:xfrm>
+            <a:off x="838080" y="365040"/>
+            <a:ext cx="10513440" cy="1323360"/>
+          </a:xfrm>
+          <a:prstGeom prst="rect">
+            <a:avLst/>
+          </a:prstGeom>
+          <a:noFill/>
+          <a:ln>
+            <a:noFill/>
+          </a:ln>
+        </p:spPr>
+        <p:style>
+          <a:lnRef idx="0"/>
+          <a:fillRef idx="0"/>
+          <a:effectRef idx="0"/>
+          <a:fontRef idx="minor"/>
+        </p:style>
+        <p:txBody>
+          <a:bodyPr lIns="0" rIns="0" tIns="0" bIns="0" anchor="ctr"/>
+          <a:p>
+            <a:pPr>
+              <a:lnSpc>
+                <a:spcPct val="100000"/>
+              </a:lnSpc>
+            </a:pPr>
+            <a:r>
+              <a:rPr b="0" lang="en-US" sz="2600" spc="-1" strike="noStrike">
+                <a:solidFill>
+                  <a:srgbClr val="000000"/>
+                </a:solidFill>
+                <a:latin typeface="Calibri"/>
+                <a:ea typeface="DejaVu Sans"/>
+              </a:rPr>
+              <a:t>Bias vs variance</a:t>
+            </a:r>
+            <a:endParaRPr b="0" lang="en-US" sz="2600" spc="-1" strike="noStrike">
+              <a:latin typeface="Arial"/>
+            </a:endParaRPr>
+          </a:p>
+          <a:p>
+            <a:pPr>
+              <a:lnSpc>
+                <a:spcPct val="100000"/>
+              </a:lnSpc>
+            </a:pPr>
+            <a:endParaRPr b="0" lang="en-US" sz="2600" spc="-1" strike="noStrike">
+              <a:latin typeface="Arial"/>
+            </a:endParaRPr>
+          </a:p>
+        </p:txBody>
+      </p:sp>
+      <p:sp>
+        <p:nvSpPr>
+          <p:cNvPr id="99" name="CustomShape 2"/>
+          <p:cNvSpPr/>
+          <p:nvPr/>
+        </p:nvSpPr>
+        <p:spPr>
+          <a:xfrm>
+            <a:off x="1188720" y="2011680"/>
+            <a:ext cx="9416520" cy="1624320"/>
+          </a:xfrm>
+          <a:prstGeom prst="rect">
+            <a:avLst/>
+          </a:prstGeom>
+          <a:noFill/>
+          <a:ln>
+            <a:noFill/>
+          </a:ln>
+        </p:spPr>
+        <p:style>
+          <a:lnRef idx="0"/>
+          <a:fillRef idx="0"/>
+          <a:effectRef idx="0"/>
+          <a:fontRef idx="minor"/>
+        </p:style>
+      </p:sp>
+      <p:pic>
+        <p:nvPicPr>
+          <p:cNvPr id="100" name="" descr=""/>
+          <p:cNvPicPr/>
+          <p:nvPr/>
+        </p:nvPicPr>
+        <p:blipFill>
+          <a:blip r:embed="rId1"/>
+          <a:stretch/>
+        </p:blipFill>
+        <p:spPr>
+          <a:xfrm>
+            <a:off x="4480560" y="640080"/>
+            <a:ext cx="2542680" cy="828360"/>
+          </a:xfrm>
+          <a:prstGeom prst="rect">
+            <a:avLst/>
+          </a:prstGeom>
+          <a:ln>
+            <a:noFill/>
+          </a:ln>
+        </p:spPr>
+      </p:pic>
+      <p:sp>
+        <p:nvSpPr>
+          <p:cNvPr id="101" name="CustomShape 3"/>
+          <p:cNvSpPr/>
+          <p:nvPr/>
+        </p:nvSpPr>
+        <p:spPr>
+          <a:xfrm>
+            <a:off x="1188720" y="2183040"/>
+            <a:ext cx="9416520" cy="1624320"/>
+          </a:xfrm>
+          <a:prstGeom prst="rect">
+            <a:avLst/>
+          </a:prstGeom>
+          <a:noFill/>
+          <a:ln>
+            <a:noFill/>
+          </a:ln>
+        </p:spPr>
+        <p:style>
+          <a:lnRef idx="0"/>
+          <a:fillRef idx="0"/>
+          <a:effectRef idx="0"/>
+          <a:fontRef idx="minor"/>
+        </p:style>
+        <p:txBody>
+          <a:bodyPr lIns="90000" rIns="90000" tIns="45000" bIns="45000"/>
+          <a:p>
+            <a:pPr>
+              <a:lnSpc>
+                <a:spcPct val="100000"/>
+              </a:lnSpc>
+            </a:pPr>
+            <a:r>
+              <a:rPr b="0" lang="en-US" sz="1800" spc="-1" strike="noStrike">
+                <a:solidFill>
+                  <a:srgbClr val="0563c1"/>
+                </a:solidFill>
+                <a:latin typeface="Arial"/>
+                <a:ea typeface="DejaVu Sans"/>
+              </a:rPr>
+              <a:t>_k – miara przestrzeni modeli</a:t>
+            </a:r>
+            <a:endParaRPr b="0" lang="en-US" sz="1800" spc="-1" strike="noStrike">
+              <a:latin typeface="Arial"/>
+            </a:endParaRPr>
+          </a:p>
+          <a:p>
+            <a:pPr>
+              <a:lnSpc>
+                <a:spcPct val="100000"/>
+              </a:lnSpc>
+            </a:pPr>
+            <a:endParaRPr b="0" lang="en-US" sz="1800" spc="-1" strike="noStrike">
+              <a:latin typeface="Arial"/>
+            </a:endParaRPr>
+          </a:p>
+          <a:p>
+            <a:pPr>
+              <a:lnSpc>
+                <a:spcPct val="100000"/>
+              </a:lnSpc>
+            </a:pPr>
+            <a:r>
+              <a:rPr b="0" lang="en-US" sz="1800" spc="-1" strike="noStrike">
+                <a:solidFill>
+                  <a:srgbClr val="0563c1"/>
+                </a:solidFill>
+                <a:latin typeface="Arial"/>
+                <a:ea typeface="DejaVu Sans"/>
+              </a:rPr>
+              <a:t>Im wiecej modeli tym mniejsze ich minimum (BIAS), ale wieksza wariancja (pierwiastek).</a:t>
+            </a:r>
+            <a:endParaRPr b="0" lang="en-US" sz="1800" spc="-1" strike="noStrike">
+              <a:latin typeface="Arial"/>
+            </a:endParaRPr>
+          </a:p>
+          <a:p>
+            <a:pPr>
+              <a:lnSpc>
+                <a:spcPct val="100000"/>
+              </a:lnSpc>
+            </a:pPr>
+            <a:endParaRPr b="0" lang="en-US" sz="1800" spc="-1" strike="noStrike">
+              <a:latin typeface="Arial"/>
+            </a:endParaRPr>
+          </a:p>
+          <a:p>
+            <a:pPr>
+              <a:lnSpc>
+                <a:spcPct val="100000"/>
+              </a:lnSpc>
+            </a:pPr>
+            <a:r>
+              <a:rPr b="0" lang="en-US" sz="1800" spc="-1" strike="noStrike">
+                <a:solidFill>
+                  <a:srgbClr val="0563c1"/>
+                </a:solidFill>
+                <a:latin typeface="Arial"/>
+                <a:ea typeface="DejaVu Sans"/>
+              </a:rPr>
+              <a:t>Źródło: CS229 Learning theory.</a:t>
+            </a:r>
+            <a:endParaRPr b="0" lang="en-US" sz="1800" spc="-1" strike="noStrike">
+              <a:latin typeface="Arial"/>
+            </a:endParaRPr>
+          </a:p>
+        </p:txBody>
+      </p:sp>
+    </p:spTree>
+  </p:cSld>
+  <p:timing>
+    <p:tnLst>
+      <p:par>
+        <p:cTn id="21" dur="indefinite" restart="never" nodeType="tmRoot">
+          <p:childTnLst>
+            <p:seq>
+              <p:cTn id="22" dur="indefinite" nodeType="mainSeq"/>
               <p:prevCondLst>
                 <p:cond delay="0" evt="onPrev">
                   <p:tgtEl>
@@ -3732,7 +4208,7 @@
         <p:spPr>
           <a:xfrm>
             <a:off x="838080" y="365040"/>
-            <a:ext cx="10514160" cy="1324080"/>
+            <a:ext cx="10513440" cy="1323360"/>
           </a:xfrm>
           <a:prstGeom prst="rect">
             <a:avLst/>
@@ -3781,7 +4257,7 @@
         <p:spPr>
           <a:xfrm>
             <a:off x="838080" y="1825560"/>
-            <a:ext cx="10514160" cy="4349880"/>
+            <a:ext cx="10513440" cy="4349160"/>
           </a:xfrm>
           <a:prstGeom prst="rect">
             <a:avLst/>
@@ -3800,7 +4276,7 @@
         <p:txBody>
           <a:bodyPr lIns="90000" rIns="90000" tIns="45000" bIns="45000"/>
           <a:p>
-            <a:pPr marL="228600" indent="-227160">
+            <a:pPr marL="228600" indent="-226440">
               <a:lnSpc>
                 <a:spcPct val="90000"/>
               </a:lnSpc>
@@ -3828,7 +4304,7 @@
             </a:endParaRPr>
           </a:p>
           <a:p>
-            <a:pPr marL="228600" indent="-227160">
+            <a:pPr marL="228600" indent="-226440">
               <a:lnSpc>
                 <a:spcPct val="90000"/>
               </a:lnSpc>
@@ -4004,7 +4480,7 @@
         <p:spPr>
           <a:xfrm>
             <a:off x="838080" y="365040"/>
-            <a:ext cx="10514160" cy="1324080"/>
+            <a:ext cx="10513440" cy="1323360"/>
           </a:xfrm>
           <a:prstGeom prst="rect">
             <a:avLst/>
@@ -4053,7 +4529,7 @@
         <p:spPr>
           <a:xfrm>
             <a:off x="838080" y="1825560"/>
-            <a:ext cx="10514160" cy="4349880"/>
+            <a:ext cx="10513440" cy="4349160"/>
           </a:xfrm>
           <a:prstGeom prst="rect">
             <a:avLst/>
@@ -4393,7 +4869,7 @@
         <p:spPr>
           <a:xfrm>
             <a:off x="838080" y="365040"/>
-            <a:ext cx="10514160" cy="1324080"/>
+            <a:ext cx="10513440" cy="1323360"/>
           </a:xfrm>
           <a:prstGeom prst="rect">
             <a:avLst/>
@@ -4442,7 +4918,7 @@
         <p:spPr>
           <a:xfrm>
             <a:off x="838080" y="1825560"/>
-            <a:ext cx="10514160" cy="4349880"/>
+            <a:ext cx="10513440" cy="4349160"/>
           </a:xfrm>
           <a:prstGeom prst="rect">
             <a:avLst/>
@@ -4463,7 +4939,7 @@
             <a:normAutofit/>
           </a:bodyPr>
           <a:p>
-            <a:pPr marL="228600" indent="-227160">
+            <a:pPr marL="228600" indent="-226440">
               <a:lnSpc>
                 <a:spcPct val="90000"/>
               </a:lnSpc>
@@ -4491,7 +4967,7 @@
             </a:endParaRPr>
           </a:p>
           <a:p>
-            <a:pPr marL="228600" indent="-227160">
+            <a:pPr marL="228600" indent="-226440">
               <a:lnSpc>
                 <a:spcPct val="90000"/>
               </a:lnSpc>
@@ -4578,7 +5054,7 @@
         <p:spPr>
           <a:xfrm>
             <a:off x="838080" y="365040"/>
-            <a:ext cx="10514160" cy="1324080"/>
+            <a:ext cx="10513440" cy="1323360"/>
           </a:xfrm>
           <a:prstGeom prst="rect">
             <a:avLst/>
@@ -4627,7 +5103,7 @@
         <p:spPr>
           <a:xfrm>
             <a:off x="1188720" y="2011680"/>
-            <a:ext cx="9417240" cy="1625040"/>
+            <a:ext cx="9416520" cy="1624320"/>
           </a:xfrm>
           <a:prstGeom prst="rect">
             <a:avLst/>
@@ -4807,7 +5283,7 @@
         <p:spPr>
           <a:xfrm>
             <a:off x="838080" y="365040"/>
-            <a:ext cx="10514160" cy="1324080"/>
+            <a:ext cx="10513440" cy="1323360"/>
           </a:xfrm>
           <a:prstGeom prst="rect">
             <a:avLst/>
@@ -4856,7 +5332,7 @@
         <p:spPr>
           <a:xfrm>
             <a:off x="1188720" y="2011680"/>
-            <a:ext cx="9417240" cy="1625040"/>
+            <a:ext cx="9416520" cy="1624320"/>
           </a:xfrm>
           <a:prstGeom prst="rect">
             <a:avLst/>
@@ -4994,7 +5470,7 @@
         <p:spPr>
           <a:xfrm>
             <a:off x="838080" y="365040"/>
-            <a:ext cx="10514160" cy="1324080"/>
+            <a:ext cx="10513440" cy="1323360"/>
           </a:xfrm>
           <a:prstGeom prst="rect">
             <a:avLst/>
@@ -5043,7 +5519,7 @@
         <p:spPr>
           <a:xfrm>
             <a:off x="1188720" y="2011680"/>
-            <a:ext cx="9417240" cy="1625040"/>
+            <a:ext cx="9416520" cy="1624320"/>
           </a:xfrm>
           <a:prstGeom prst="rect">
             <a:avLst/>
@@ -5181,7 +5657,7 @@
         <p:spPr>
           <a:xfrm>
             <a:off x="838080" y="365040"/>
-            <a:ext cx="10514160" cy="1324080"/>
+            <a:ext cx="10513440" cy="1323360"/>
           </a:xfrm>
           <a:prstGeom prst="rect">
             <a:avLst/>
@@ -5240,7 +5716,7 @@
         <p:spPr>
           <a:xfrm>
             <a:off x="1188720" y="2011680"/>
-            <a:ext cx="9417240" cy="1625040"/>
+            <a:ext cx="9416520" cy="1624320"/>
           </a:xfrm>
           <a:prstGeom prst="rect">
             <a:avLst/>
@@ -5289,6 +5765,233 @@
           <p:childTnLst>
             <p:seq>
               <p:cTn id="16" dur="indefinite" nodeType="mainSeq"/>
+              <p:prevCondLst>
+                <p:cond delay="0" evt="onPrev">
+                  <p:tgtEl>
+                    <p:sldTgt/>
+                  </p:tgtEl>
+                </p:cond>
+              </p:prevCondLst>
+              <p:nextCondLst>
+                <p:cond delay="0" evt="onNext">
+                  <p:tgtEl>
+                    <p:sldTgt/>
+                  </p:tgtEl>
+                </p:cond>
+              </p:nextCondLst>
+            </p:seq>
+          </p:childTnLst>
+        </p:cTn>
+      </p:par>
+    </p:tnLst>
+  </p:timing>
+</p:sld>
+</file>
+
+<file path=ppt/slides/slide9.xml><?xml version="1.0" encoding="utf-8"?>
+<p:sld xmlns:a="http://schemas.openxmlformats.org/drawingml/2006/main" xmlns:p="http://schemas.openxmlformats.org/presentationml/2006/main" xmlns:r="http://schemas.openxmlformats.org/officeDocument/2006/relationships" xmlns:p14="http://schemas.microsoft.com/office/powerpoint/2010/main" xmlns:p15="http://schemas.microsoft.com/office/powerpoint/2012/main" xmlns:mc="http://schemas.openxmlformats.org/markup-compatibility/2006">
+  <p:cSld>
+    <p:spTree>
+      <p:nvGrpSpPr>
+        <p:cNvPr id="1" name=""/>
+        <p:cNvGrpSpPr/>
+        <p:nvPr/>
+      </p:nvGrpSpPr>
+      <p:grpSpPr>
+        <a:xfrm>
+          <a:off x="0" y="0"/>
+          <a:ext cx="0" cy="0"/>
+          <a:chOff x="0" y="0"/>
+          <a:chExt cx="0" cy="0"/>
+        </a:xfrm>
+      </p:grpSpPr>
+      <p:sp>
+        <p:nvSpPr>
+          <p:cNvPr id="93" name="CustomShape 1"/>
+          <p:cNvSpPr/>
+          <p:nvPr/>
+        </p:nvSpPr>
+        <p:spPr>
+          <a:xfrm>
+            <a:off x="838080" y="365040"/>
+            <a:ext cx="10513440" cy="1323360"/>
+          </a:xfrm>
+          <a:prstGeom prst="rect">
+            <a:avLst/>
+          </a:prstGeom>
+          <a:noFill/>
+          <a:ln>
+            <a:noFill/>
+          </a:ln>
+        </p:spPr>
+        <p:style>
+          <a:lnRef idx="0"/>
+          <a:fillRef idx="0"/>
+          <a:effectRef idx="0"/>
+          <a:fontRef idx="minor"/>
+        </p:style>
+        <p:txBody>
+          <a:bodyPr lIns="0" rIns="0" tIns="0" bIns="0" anchor="ctr"/>
+          <a:p>
+            <a:pPr>
+              <a:lnSpc>
+                <a:spcPct val="100000"/>
+              </a:lnSpc>
+            </a:pPr>
+            <a:r>
+              <a:rPr b="0" lang="en-US" sz="2600" spc="-1" strike="noStrike">
+                <a:solidFill>
+                  <a:srgbClr val="000000"/>
+                </a:solidFill>
+                <a:latin typeface="Calibri"/>
+                <a:ea typeface="DejaVu Sans"/>
+              </a:rPr>
+              <a:t>Optimization algorithms</a:t>
+            </a:r>
+            <a:endParaRPr b="0" lang="en-US" sz="2600" spc="-1" strike="noStrike">
+              <a:latin typeface="Arial"/>
+            </a:endParaRPr>
+          </a:p>
+        </p:txBody>
+      </p:sp>
+      <p:sp>
+        <p:nvSpPr>
+          <p:cNvPr id="94" name="CustomShape 2"/>
+          <p:cNvSpPr/>
+          <p:nvPr/>
+        </p:nvSpPr>
+        <p:spPr>
+          <a:xfrm>
+            <a:off x="1188720" y="2011680"/>
+            <a:ext cx="9416520" cy="1624320"/>
+          </a:xfrm>
+          <a:prstGeom prst="rect">
+            <a:avLst/>
+          </a:prstGeom>
+          <a:noFill/>
+          <a:ln>
+            <a:noFill/>
+          </a:ln>
+        </p:spPr>
+        <p:style>
+          <a:lnRef idx="0"/>
+          <a:fillRef idx="0"/>
+          <a:effectRef idx="0"/>
+          <a:fontRef idx="minor"/>
+        </p:style>
+        <p:txBody>
+          <a:bodyPr lIns="90000" rIns="90000" tIns="45000" bIns="45000"/>
+          <a:p>
+            <a:pPr>
+              <a:lnSpc>
+                <a:spcPct val="100000"/>
+              </a:lnSpc>
+            </a:pPr>
+            <a:r>
+              <a:rPr b="0" lang="en-US" sz="1800" spc="-1" strike="noStrike">
+                <a:solidFill>
+                  <a:srgbClr val="0563c1"/>
+                </a:solidFill>
+                <a:latin typeface="Arial"/>
+                <a:ea typeface="DejaVu Sans"/>
+              </a:rPr>
+              <a:t>Służą do szukania ekstremów, gdzie klasyczne metody (pochodna) zawodzą.</a:t>
+            </a:r>
+            <a:endParaRPr b="0" lang="en-US" sz="1800" spc="-1" strike="noStrike">
+              <a:latin typeface="Arial"/>
+            </a:endParaRPr>
+          </a:p>
+          <a:p>
+            <a:pPr>
+              <a:lnSpc>
+                <a:spcPct val="100000"/>
+              </a:lnSpc>
+            </a:pPr>
+            <a:r>
+              <a:rPr b="0" lang="en-US" sz="1800" spc="-1" strike="noStrike">
+                <a:solidFill>
+                  <a:srgbClr val="0563c1"/>
+                </a:solidFill>
+                <a:latin typeface="Arial"/>
+                <a:ea typeface="DejaVu Sans"/>
+              </a:rPr>
+              <a:t>Przyklady:</a:t>
+            </a:r>
+            <a:endParaRPr b="0" lang="en-US" sz="1800" spc="-1" strike="noStrike">
+              <a:latin typeface="Arial"/>
+            </a:endParaRPr>
+          </a:p>
+          <a:p>
+            <a:pPr>
+              <a:lnSpc>
+                <a:spcPct val="100000"/>
+              </a:lnSpc>
+            </a:pPr>
+            <a:r>
+              <a:rPr b="0" lang="en-US" sz="1800" spc="-1" strike="noStrike">
+                <a:solidFill>
+                  <a:srgbClr val="0563c1"/>
+                </a:solidFill>
+                <a:latin typeface="Arial"/>
+                <a:ea typeface="DejaVu Sans"/>
+              </a:rPr>
+              <a:t>- gradient ascent (zblizenie w kierunku maksymalnego wzrostu),</a:t>
+            </a:r>
+            <a:endParaRPr b="0" lang="en-US" sz="1800" spc="-1" strike="noStrike">
+              <a:latin typeface="Arial"/>
+            </a:endParaRPr>
+          </a:p>
+          <a:p>
+            <a:pPr>
+              <a:lnSpc>
+                <a:spcPct val="100000"/>
+              </a:lnSpc>
+            </a:pPr>
+            <a:r>
+              <a:rPr b="0" lang="en-US" sz="1800" spc="-1" strike="noStrike">
+                <a:solidFill>
+                  <a:srgbClr val="0563c1"/>
+                </a:solidFill>
+                <a:latin typeface="Arial"/>
+                <a:ea typeface="DejaVu Sans"/>
+              </a:rPr>
+              <a:t>- coordinate ascent (j.w. ale po kazdym parametrze z osobna – za kazdym razem wzdluż jednej osi),</a:t>
+            </a:r>
+            <a:endParaRPr b="0" lang="en-US" sz="1800" spc="-1" strike="noStrike">
+              <a:latin typeface="Arial"/>
+            </a:endParaRPr>
+          </a:p>
+          <a:p>
+            <a:pPr>
+              <a:lnSpc>
+                <a:spcPct val="100000"/>
+              </a:lnSpc>
+            </a:pPr>
+            <a:r>
+              <a:rPr b="0" lang="en-US" sz="1800" spc="-1" strike="noStrike">
+                <a:solidFill>
+                  <a:srgbClr val="0563c1"/>
+                </a:solidFill>
+                <a:latin typeface="Arial"/>
+                <a:ea typeface="DejaVu Sans"/>
+              </a:rPr>
+              <a:t>- Newton Method (tutaj interesuje nas pochodna, a nie sama funkcja. Szukamy jej zera stycznymi).</a:t>
+            </a:r>
+            <a:endParaRPr b="0" lang="en-US" sz="1800" spc="-1" strike="noStrike">
+              <a:latin typeface="Arial"/>
+            </a:endParaRPr>
+          </a:p>
+        </p:txBody>
+      </p:sp>
+    </p:spTree>
+  </p:cSld>
+  <p:timing>
+    <p:tnLst>
+      <p:par>
+        <p:cTn id="17" dur="indefinite" restart="never" nodeType="tmRoot">
+          <p:childTnLst>
+            <p:seq>
+              <p:cTn id="18" dur="indefinite" nodeType="mainSeq"/>
               <p:prevCondLst>
                 <p:cond delay="0" evt="onPrev">
                   <p:tgtEl>

</xml_diff>